<commit_message>
1ra. Correción entrega final
</commit_message>
<xml_diff>
--- a/Entregas/Entrega Final/Documento Ejecutivo.pptx
+++ b/Entregas/Entrega Final/Documento Ejecutivo.pptx
@@ -8046,7 +8046,7 @@
           <a:p>
             <a:r>
               <a:rPr lang="es-ES" sz="2000" dirty="0" smtClean="0"/>
-              <a:t>La empresa tiene dos objetivos principales a resolver:</a:t>
+              <a:t>El análisis exploratorio dio como resultado más bien inesperado</a:t>
             </a:r>
             <a:endParaRPr lang="en-US" sz="2000" dirty="0"/>
           </a:p>
@@ -8080,8 +8080,9 @@
             </a:pPr>
             <a:r>
               <a:rPr lang="es-ES" sz="2000" dirty="0" smtClean="0"/>
-              <a:t>La segmentación y clasificación de clientes, si bien hoy existe una clasificación, no se está haciendo a conciencia, es decir, analizando la realidad de cada cliente, es por eso que hace falta clasificarlos y automatizar el proceso para direccionar mejor las campañas de venta.</a:t>
-            </a:r>
+              <a:t>La segmentación de clientes no sólo no está completa, sino que no tiene demasiado sentido o está mal hecha.</a:t>
+            </a:r>
+            <a:endParaRPr lang="es-ES" sz="2000" dirty="0" smtClean="0"/>
           </a:p>
           <a:p>
             <a:pPr marL="457200" indent="-457200">
@@ -8090,15 +8091,17 @@
             </a:pPr>
             <a:r>
               <a:rPr lang="es-ES" sz="2000" dirty="0" smtClean="0"/>
-              <a:t>El segundo objetivo y más ambicioso, es poder automatizar el </a:t>
-            </a:r>
-            <a:r>
-              <a:rPr lang="es-ES" sz="2000" dirty="0" err="1" smtClean="0"/>
-              <a:t>forecast</a:t>
-            </a:r>
+              <a:t>La predicción de ventas no es viable sólo con los datos que existen hoy en el sistema, es probable que se necesite más información para poder lograr este objetivo.</a:t>
+            </a:r>
+          </a:p>
+          <a:p>
+            <a:pPr marL="457200" indent="-457200">
+              <a:buFont typeface="+mj-lt"/>
+              <a:buAutoNum type="arabicPeriod"/>
+            </a:pPr>
             <a:r>
               <a:rPr lang="es-ES" sz="2000" dirty="0" smtClean="0"/>
-              <a:t> de ventas anual. Esta también es una tarea que se realiza manualmente y que tiene mucho por mejorar porque es producto de aplicar al histórico de ventas un coeficiente arbitrario.</a:t>
+              <a:t>La mayor correlación se da en la venta dividida por región, coincidiendo con un esquema demográfico, pero no se puede deducir en función de las características del cliente y/o producto.</a:t>
             </a:r>
             <a:endParaRPr lang="en-US" sz="2000" dirty="0"/>
           </a:p>
@@ -8216,7 +8219,7 @@
         <p:spPr>
           <a:xfrm>
             <a:off x="311701" y="1489166"/>
-            <a:ext cx="8593436" cy="400110"/>
+            <a:ext cx="8593436" cy="707886"/>
           </a:xfrm>
           <a:prstGeom prst="rect">
             <a:avLst/>
@@ -8231,9 +8234,13 @@
           <a:p>
             <a:r>
               <a:rPr lang="es-ES" sz="2000" dirty="0" smtClean="0"/>
-              <a:t>La empresa tiene dos objetivos principales a resolver:</a:t>
-            </a:r>
-            <a:endParaRPr lang="en-US" sz="2000" dirty="0"/>
+              <a:t>En función del EDA, el algoritmo escogido para satisfacer el primer objetivo es </a:t>
+            </a:r>
+            <a:r>
+              <a:rPr lang="es-ES" sz="2000" b="1" dirty="0" err="1" smtClean="0"/>
+              <a:t>Kmeans</a:t>
+            </a:r>
+            <a:endParaRPr lang="en-US" sz="2000" b="1" dirty="0"/>
           </a:p>
         </p:txBody>
       </p:sp>
@@ -8246,7 +8253,7 @@
         <p:spPr>
           <a:xfrm>
             <a:off x="311700" y="2234993"/>
-            <a:ext cx="8593437" cy="2554545"/>
+            <a:ext cx="8593437" cy="1015663"/>
           </a:xfrm>
           <a:prstGeom prst="rect">
             <a:avLst/>
@@ -8259,31 +8266,9 @@
           </a:bodyPr>
           <a:lstStyle/>
           <a:p>
-            <a:pPr marL="457200" indent="-457200">
-              <a:buFont typeface="+mj-lt"/>
-              <a:buAutoNum type="arabicPeriod"/>
-            </a:pPr>
             <a:r>
               <a:rPr lang="es-ES" sz="2000" dirty="0" smtClean="0"/>
-              <a:t>La segmentación y clasificación de clientes, si bien hoy existe una clasificación, no se está haciendo a conciencia, es decir, analizando la realidad de cada cliente, es por eso que hace falta clasificarlos y automatizar el proceso para direccionar mejor las campañas de venta.</a:t>
-            </a:r>
-          </a:p>
-          <a:p>
-            <a:pPr marL="457200" indent="-457200">
-              <a:buFont typeface="+mj-lt"/>
-              <a:buAutoNum type="arabicPeriod"/>
-            </a:pPr>
-            <a:r>
-              <a:rPr lang="es-ES" sz="2000" dirty="0" smtClean="0"/>
-              <a:t>El segundo objetivo y más ambicioso, es poder automatizar el </a:t>
-            </a:r>
-            <a:r>
-              <a:rPr lang="es-ES" sz="2000" dirty="0" err="1" smtClean="0"/>
-              <a:t>forecast</a:t>
-            </a:r>
-            <a:r>
-              <a:rPr lang="es-ES" sz="2000" dirty="0" smtClean="0"/>
-              <a:t> de ventas anual. Esta también es una tarea que se realiza manualmente y que tiene mucho por mejorar porque es producto de aplicar al histórico de ventas un coeficiente arbitrario.</a:t>
+              <a:t>Si bien el objetivo principal era segmentar los clientes, vemos que sería importante y más factible con los datos que hay hoy, clasificar las ventas para poder luego simplificar los futuros objetivos y sus modelos</a:t>
             </a:r>
             <a:endParaRPr lang="en-US" sz="2000" dirty="0"/>
           </a:p>
@@ -8394,7 +8379,7 @@
       </p:pic>
       <p:sp>
         <p:nvSpPr>
-          <p:cNvPr id="2" name="CuadroTexto 1"/>
+          <p:cNvPr id="6" name="CuadroTexto 5"/>
           <p:cNvSpPr txBox="1"/>
           <p:nvPr/>
         </p:nvSpPr>
@@ -8416,7 +8401,15 @@
           <a:p>
             <a:r>
               <a:rPr lang="es-ES" sz="2000" dirty="0" smtClean="0"/>
-              <a:t>La empresa tiene dos objetivos principales a resolver:</a:t>
+              <a:t>Para poder elegir bien los </a:t>
+            </a:r>
+            <a:r>
+              <a:rPr lang="es-ES" sz="2000" dirty="0" err="1" smtClean="0"/>
+              <a:t>hyper</a:t>
+            </a:r>
+            <a:r>
+              <a:rPr lang="es-ES" sz="2000" dirty="0" smtClean="0"/>
+              <a:t>-parámetros se emplearon dos métodos:</a:t>
             </a:r>
             <a:endParaRPr lang="en-US" sz="2000" dirty="0"/>
           </a:p>
@@ -8424,7 +8417,7 @@
       </p:sp>
       <p:sp>
         <p:nvSpPr>
-          <p:cNvPr id="35" name="CuadroTexto 34"/>
+          <p:cNvPr id="7" name="CuadroTexto 6"/>
           <p:cNvSpPr txBox="1"/>
           <p:nvPr/>
         </p:nvSpPr>
@@ -8450,8 +8443,25 @@
             </a:pPr>
             <a:r>
               <a:rPr lang="es-ES" sz="2000" dirty="0" smtClean="0"/>
-              <a:t>La segmentación y clasificación de clientes, si bien hoy existe una clasificación, no se está haciendo a conciencia, es decir, analizando la realidad de cada cliente, es por eso que hace falta clasificarlos y automatizar el proceso para direccionar mejor las campañas de venta.</a:t>
-            </a:r>
+              <a:t>Primero se utilizó el método </a:t>
+            </a:r>
+            <a:r>
+              <a:rPr lang="es-ES" sz="2000" b="1" dirty="0" err="1" smtClean="0"/>
+              <a:t>Elbow</a:t>
+            </a:r>
+            <a:r>
+              <a:rPr lang="es-ES" sz="2000" dirty="0" smtClean="0"/>
+              <a:t> (codo) en el que se puede evidenciar de forma gráfica cual sería la cantidad de </a:t>
+            </a:r>
+            <a:r>
+              <a:rPr lang="es-ES" sz="2000" dirty="0" err="1" smtClean="0"/>
+              <a:t>clusters</a:t>
+            </a:r>
+            <a:r>
+              <a:rPr lang="es-ES" sz="2000" dirty="0" smtClean="0"/>
+              <a:t> óptima para segmentar las ventas el resultado fue 4 con un índice de 0.688.</a:t>
+            </a:r>
+            <a:endParaRPr lang="es-ES" sz="2000" dirty="0" smtClean="0"/>
           </a:p>
           <a:p>
             <a:pPr marL="457200" indent="-457200">
@@ -8460,15 +8470,47 @@
             </a:pPr>
             <a:r>
               <a:rPr lang="es-ES" sz="2000" dirty="0" smtClean="0"/>
-              <a:t>El segundo objetivo y más ambicioso, es poder automatizar el </a:t>
+              <a:t>Luego para hacer un análisis más fino se utilizó el método </a:t>
+            </a:r>
+            <a:r>
+              <a:rPr lang="es-ES" sz="2000" b="1" dirty="0" err="1" smtClean="0"/>
+              <a:t>Silhouette</a:t>
+            </a:r>
+            <a:r>
+              <a:rPr lang="es-ES" sz="2000" dirty="0" smtClean="0"/>
+              <a:t>, que en función del resultado anterior se realizó ente 2, 3, 4, y 5 </a:t>
             </a:r>
             <a:r>
               <a:rPr lang="es-ES" sz="2000" dirty="0" err="1" smtClean="0"/>
-              <a:t>forecast</a:t>
+              <a:t>clusters</a:t>
             </a:r>
             <a:r>
               <a:rPr lang="es-ES" sz="2000" dirty="0" smtClean="0"/>
-              <a:t> de ventas anual. Esta también es una tarea que se realiza manualmente y que tiene mucho por mejorar porque es producto de aplicar al histórico de ventas un coeficiente arbitrario.</a:t>
+              <a:t>, como resultado pudimos ver que si bien con </a:t>
+            </a:r>
+            <a:r>
+              <a:rPr lang="es-ES" sz="2000" b="1" dirty="0" smtClean="0"/>
+              <a:t>5 </a:t>
+            </a:r>
+            <a:r>
+              <a:rPr lang="es-ES" sz="2000" b="1" dirty="0" err="1" smtClean="0"/>
+              <a:t>clusters</a:t>
+            </a:r>
+            <a:r>
+              <a:rPr lang="es-ES" sz="2000" b="1" dirty="0" smtClean="0"/>
+              <a:t> </a:t>
+            </a:r>
+            <a:r>
+              <a:rPr lang="es-ES" sz="2000" dirty="0" smtClean="0"/>
+              <a:t>el índice era apenas más bajo, la distribución era más homogénea y cercana en todos los </a:t>
+            </a:r>
+            <a:r>
+              <a:rPr lang="es-ES" sz="2000" dirty="0" err="1" smtClean="0"/>
+              <a:t>clusters</a:t>
+            </a:r>
+            <a:r>
+              <a:rPr lang="es-ES" sz="2000" dirty="0" smtClean="0"/>
+              <a:t> al índice promedio</a:t>
             </a:r>
             <a:endParaRPr lang="en-US" sz="2000" dirty="0"/>
           </a:p>
@@ -8601,7 +8643,7 @@
           <a:p>
             <a:r>
               <a:rPr lang="es-ES" sz="2000" dirty="0" smtClean="0"/>
-              <a:t>La empresa tiene dos objetivos principales a resolver:</a:t>
+              <a:t>Pasos a seguir para avanzar con el proyecto:</a:t>
             </a:r>
             <a:endParaRPr lang="en-US" sz="2000" dirty="0"/>
           </a:p>
@@ -8616,7 +8658,7 @@
         <p:spPr>
           <a:xfrm>
             <a:off x="311700" y="2234993"/>
-            <a:ext cx="8593437" cy="2554545"/>
+            <a:ext cx="8593437" cy="1631216"/>
           </a:xfrm>
           <a:prstGeom prst="rect">
             <a:avLst/>
@@ -8635,8 +8677,9 @@
             </a:pPr>
             <a:r>
               <a:rPr lang="es-ES" sz="2000" dirty="0" smtClean="0"/>
-              <a:t>La segmentación y clasificación de clientes, si bien hoy existe una clasificación, no se está haciendo a conciencia, es decir, analizando la realidad de cada cliente, es por eso que hace falta clasificarlos y automatizar el proceso para direccionar mejor las campañas de venta.</a:t>
-            </a:r>
+              <a:t>Si bien los objetivos primarios no se lograron, se avanzó para poder recolectar más información de los clientes y poder finalmente clasificarlos, independientemente de las ventas acumuladas.</a:t>
+            </a:r>
+            <a:endParaRPr lang="es-ES" sz="2000" dirty="0" smtClean="0"/>
           </a:p>
           <a:p>
             <a:pPr marL="457200" indent="-457200">
@@ -8645,15 +8688,7 @@
             </a:pPr>
             <a:r>
               <a:rPr lang="es-ES" sz="2000" dirty="0" smtClean="0"/>
-              <a:t>El segundo objetivo y más ambicioso, es poder automatizar el </a:t>
-            </a:r>
-            <a:r>
-              <a:rPr lang="es-ES" sz="2000" dirty="0" err="1" smtClean="0"/>
-              <a:t>forecast</a:t>
-            </a:r>
-            <a:r>
-              <a:rPr lang="es-ES" sz="2000" dirty="0" smtClean="0"/>
-              <a:t> de ventas anual. Esta también es una tarea que se realiza manualmente y que tiene mucho por mejorar porque es producto de aplicar al histórico de ventas un coeficiente arbitrario.</a:t>
+              <a:t>Ya una vez hecho esto se puede avanzar en algún modelo para generar automáticamente el presupuesto de ventas.</a:t>
             </a:r>
             <a:endParaRPr lang="en-US" sz="2000" dirty="0"/>
           </a:p>
@@ -8786,9 +8821,17 @@
           <a:p>
             <a:r>
               <a:rPr lang="es-ES" sz="2000" dirty="0" smtClean="0"/>
-              <a:t>La empresa tiene dos objetivos principales a resolver:</a:t>
-            </a:r>
-            <a:endParaRPr lang="en-US" sz="2000" dirty="0"/>
+              <a:t>Sabor </a:t>
+            </a:r>
+            <a:r>
+              <a:rPr lang="es-ES" sz="2000" b="1" dirty="0" err="1" smtClean="0"/>
+              <a:t>Agri</a:t>
+            </a:r>
+            <a:r>
+              <a:rPr lang="es-ES" sz="2000" b="1" dirty="0" smtClean="0"/>
+              <a:t>-Dulce</a:t>
+            </a:r>
+            <a:endParaRPr lang="en-US" sz="2000" b="1" dirty="0"/>
           </a:p>
         </p:txBody>
       </p:sp>
@@ -8801,7 +8844,7 @@
         <p:spPr>
           <a:xfrm>
             <a:off x="311700" y="2234993"/>
-            <a:ext cx="8593437" cy="2554545"/>
+            <a:ext cx="8593437" cy="1938992"/>
           </a:xfrm>
           <a:prstGeom prst="rect">
             <a:avLst/>
@@ -8814,31 +8857,9 @@
           </a:bodyPr>
           <a:lstStyle/>
           <a:p>
-            <a:pPr marL="457200" indent="-457200">
-              <a:buFont typeface="+mj-lt"/>
-              <a:buAutoNum type="arabicPeriod"/>
-            </a:pPr>
             <a:r>
               <a:rPr lang="es-ES" sz="2000" dirty="0" smtClean="0"/>
-              <a:t>La segmentación y clasificación de clientes, si bien hoy existe una clasificación, no se está haciendo a conciencia, es decir, analizando la realidad de cada cliente, es por eso que hace falta clasificarlos y automatizar el proceso para direccionar mejor las campañas de venta.</a:t>
-            </a:r>
-          </a:p>
-          <a:p>
-            <a:pPr marL="457200" indent="-457200">
-              <a:buFont typeface="+mj-lt"/>
-              <a:buAutoNum type="arabicPeriod"/>
-            </a:pPr>
-            <a:r>
-              <a:rPr lang="es-ES" sz="2000" dirty="0" smtClean="0"/>
-              <a:t>El segundo objetivo y más ambicioso, es poder automatizar el </a:t>
-            </a:r>
-            <a:r>
-              <a:rPr lang="es-ES" sz="2000" dirty="0" err="1" smtClean="0"/>
-              <a:t>forecast</a:t>
-            </a:r>
-            <a:r>
-              <a:rPr lang="es-ES" sz="2000" dirty="0" smtClean="0"/>
-              <a:t> de ventas anual. Esta también es una tarea que se realiza manualmente y que tiene mucho por mejorar porque es producto de aplicar al histórico de ventas un coeficiente arbitrario.</a:t>
+              <a:t>La primera conclusión es que no todos los datos se encuentran en poder de la compañía, segundo, no se pudo alcanzar ninguno de los objetivos principales, de ahí viene el sabor amargo del proyecto y por último, el proceso de análisis de los datos sumado al avance en la clasificación de las ventas posiciona de otra forma a la compañía en pos de llegar al objetivo de empezar a tomar decisiones en función de la información.</a:t>
             </a:r>
             <a:endParaRPr lang="en-US" sz="2000" dirty="0"/>
           </a:p>

</xml_diff>